<commit_message>
A few more changes on the presentation
</commit_message>
<xml_diff>
--- a/presentation/Sentiment Analysis Using a Deep Neural Network.pptx
+++ b/presentation/Sentiment Analysis Using a Deep Neural Network.pptx
@@ -529,6 +529,106 @@
           <a:lstStyle/>
           <a:p>
             <a:r>
+              <a:rPr lang="en-US" dirty="0" smtClean="0"/>
+              <a:t>The problem we are trying to solve is to rate social media, like twitter based on sentiments.</a:t>
+            </a:r>
+          </a:p>
+          <a:p>
+            <a:r>
+              <a:rPr lang="en-US" dirty="0" smtClean="0"/>
+              <a:t>Data that would come out as angry or sad would be rated as negative.</a:t>
+            </a:r>
+            <a:r>
+              <a:rPr lang="en-US" baseline="0" dirty="0" smtClean="0"/>
+              <a:t>   (excitement, laugh &gt;&gt; positive)</a:t>
+            </a:r>
+          </a:p>
+          <a:p>
+            <a:endParaRPr lang="en-US" dirty="0" smtClean="0"/>
+          </a:p>
+        </p:txBody>
+      </p:sp>
+      <p:sp>
+        <p:nvSpPr>
+          <p:cNvPr id="4" name="Slide Number Placeholder 3"/>
+          <p:cNvSpPr>
+            <a:spLocks noGrp="1"/>
+          </p:cNvSpPr>
+          <p:nvPr>
+            <p:ph type="sldNum" sz="quarter" idx="10"/>
+          </p:nvPr>
+        </p:nvSpPr>
+        <p:spPr/>
+        <p:txBody>
+          <a:bodyPr/>
+          <a:lstStyle/>
+          <a:p>
+            <a:fld id="{C341CAAC-71A7-4364-B361-21D8DE523C08}" type="slidenum">
+              <a:rPr lang="en-US" smtClean="0"/>
+              <a:t>4</a:t>
+            </a:fld>
+            <a:endParaRPr lang="en-US"/>
+          </a:p>
+        </p:txBody>
+      </p:sp>
+    </p:spTree>
+    <p:extLst>
+      <p:ext uri="{BB962C8B-B14F-4D97-AF65-F5344CB8AC3E}">
+        <p14:creationId xmlns:p14="http://schemas.microsoft.com/office/powerpoint/2010/main" val="641326782"/>
+      </p:ext>
+    </p:extLst>
+  </p:cSld>
+  <p:clrMapOvr>
+    <a:masterClrMapping/>
+  </p:clrMapOvr>
+</p:notes>
+</file>
+
+<file path=ppt/notesSlides/notesSlide2.xml><?xml version="1.0" encoding="utf-8"?>
+<p:notes xmlns:a="http://schemas.openxmlformats.org/drawingml/2006/main" xmlns:r="http://schemas.openxmlformats.org/officeDocument/2006/relationships" xmlns:p="http://schemas.openxmlformats.org/presentationml/2006/main">
+  <p:cSld>
+    <p:spTree>
+      <p:nvGrpSpPr>
+        <p:cNvPr id="1" name=""/>
+        <p:cNvGrpSpPr/>
+        <p:nvPr/>
+      </p:nvGrpSpPr>
+      <p:grpSpPr>
+        <a:xfrm>
+          <a:off x="0" y="0"/>
+          <a:ext cx="0" cy="0"/>
+          <a:chOff x="0" y="0"/>
+          <a:chExt cx="0" cy="0"/>
+        </a:xfrm>
+      </p:grpSpPr>
+      <p:sp>
+        <p:nvSpPr>
+          <p:cNvPr id="2" name="Slide Image Placeholder 1"/>
+          <p:cNvSpPr>
+            <a:spLocks noGrp="1" noRot="1" noChangeAspect="1"/>
+          </p:cNvSpPr>
+          <p:nvPr>
+            <p:ph type="sldImg"/>
+          </p:nvPr>
+        </p:nvSpPr>
+        <p:spPr/>
+      </p:sp>
+      <p:sp>
+        <p:nvSpPr>
+          <p:cNvPr id="3" name="Notes Placeholder 2"/>
+          <p:cNvSpPr>
+            <a:spLocks noGrp="1"/>
+          </p:cNvSpPr>
+          <p:nvPr>
+            <p:ph type="body" idx="1"/>
+          </p:nvPr>
+        </p:nvSpPr>
+        <p:spPr/>
+        <p:txBody>
+          <a:bodyPr/>
+          <a:lstStyle/>
+          <a:p>
+            <a:r>
               <a:rPr lang="en-US" dirty="0" err="1"/>
               <a:t>DictVectorizer</a:t>
             </a:r>
@@ -576,6 +676,108 @@
     <p:extLst>
       <p:ext uri="{BB962C8B-B14F-4D97-AF65-F5344CB8AC3E}">
         <p14:creationId xmlns:p14="http://schemas.microsoft.com/office/powerpoint/2010/main" val="290789199"/>
+      </p:ext>
+    </p:extLst>
+  </p:cSld>
+  <p:clrMapOvr>
+    <a:masterClrMapping/>
+  </p:clrMapOvr>
+</p:notes>
+</file>
+
+<file path=ppt/notesSlides/notesSlide3.xml><?xml version="1.0" encoding="utf-8"?>
+<p:notes xmlns:a="http://schemas.openxmlformats.org/drawingml/2006/main" xmlns:r="http://schemas.openxmlformats.org/officeDocument/2006/relationships" xmlns:p="http://schemas.openxmlformats.org/presentationml/2006/main">
+  <p:cSld>
+    <p:spTree>
+      <p:nvGrpSpPr>
+        <p:cNvPr id="1" name=""/>
+        <p:cNvGrpSpPr/>
+        <p:nvPr/>
+      </p:nvGrpSpPr>
+      <p:grpSpPr>
+        <a:xfrm>
+          <a:off x="0" y="0"/>
+          <a:ext cx="0" cy="0"/>
+          <a:chOff x="0" y="0"/>
+          <a:chExt cx="0" cy="0"/>
+        </a:xfrm>
+      </p:grpSpPr>
+      <p:sp>
+        <p:nvSpPr>
+          <p:cNvPr id="2" name="Slide Image Placeholder 1"/>
+          <p:cNvSpPr>
+            <a:spLocks noGrp="1" noRot="1" noChangeAspect="1"/>
+          </p:cNvSpPr>
+          <p:nvPr>
+            <p:ph type="sldImg"/>
+          </p:nvPr>
+        </p:nvSpPr>
+        <p:spPr/>
+      </p:sp>
+      <p:sp>
+        <p:nvSpPr>
+          <p:cNvPr id="3" name="Notes Placeholder 2"/>
+          <p:cNvSpPr>
+            <a:spLocks noGrp="1"/>
+          </p:cNvSpPr>
+          <p:nvPr>
+            <p:ph type="body" idx="1"/>
+          </p:nvPr>
+        </p:nvSpPr>
+        <p:spPr/>
+        <p:txBody>
+          <a:bodyPr/>
+          <a:lstStyle/>
+          <a:p>
+            <a:r>
+              <a:rPr lang="en-US" dirty="0" smtClean="0"/>
+              <a:t>Convolutional neural network</a:t>
+            </a:r>
+          </a:p>
+          <a:p>
+            <a:r>
+              <a:rPr lang="en-US" dirty="0" smtClean="0"/>
+              <a:t>Long</a:t>
+            </a:r>
+            <a:r>
+              <a:rPr lang="en-US" baseline="0" dirty="0" smtClean="0"/>
+              <a:t> short </a:t>
+            </a:r>
+            <a:r>
+              <a:rPr lang="en-US" baseline="0" smtClean="0"/>
+              <a:t>term memory</a:t>
+            </a:r>
+            <a:endParaRPr lang="en-US"/>
+          </a:p>
+        </p:txBody>
+      </p:sp>
+      <p:sp>
+        <p:nvSpPr>
+          <p:cNvPr id="4" name="Slide Number Placeholder 3"/>
+          <p:cNvSpPr>
+            <a:spLocks noGrp="1"/>
+          </p:cNvSpPr>
+          <p:nvPr>
+            <p:ph type="sldNum" sz="quarter" idx="10"/>
+          </p:nvPr>
+        </p:nvSpPr>
+        <p:spPr/>
+        <p:txBody>
+          <a:bodyPr/>
+          <a:lstStyle/>
+          <a:p>
+            <a:fld id="{C341CAAC-71A7-4364-B361-21D8DE523C08}" type="slidenum">
+              <a:rPr lang="en-US" smtClean="0"/>
+              <a:t>18</a:t>
+            </a:fld>
+            <a:endParaRPr lang="en-US"/>
+          </a:p>
+        </p:txBody>
+      </p:sp>
+    </p:spTree>
+    <p:extLst>
+      <p:ext uri="{BB962C8B-B14F-4D97-AF65-F5344CB8AC3E}">
+        <p14:creationId xmlns:p14="http://schemas.microsoft.com/office/powerpoint/2010/main" val="775537227"/>
       </p:ext>
     </p:extLst>
   </p:cSld>
@@ -3628,11 +3830,7 @@
             <a:pPr lvl="1"/>
             <a:r>
               <a:rPr lang="en-US" dirty="0"/>
-              <a:t>Normalization			</a:t>
-            </a:r>
-            <a:r>
-              <a:rPr lang="en-US" dirty="0"/>
-              <a:t>Batch</a:t>
+              <a:t>Normalization			Batch</a:t>
             </a:r>
           </a:p>
           <a:p>
@@ -4740,7 +4938,15 @@
           <a:p>
             <a:r>
               <a:rPr lang="en-US" dirty="0"/>
-              <a:t>Test set classification accuracy after training: 51% - 52%</a:t>
+              <a:t>Test set classification accuracy after training: </a:t>
+            </a:r>
+            <a:r>
+              <a:rPr lang="en-US" dirty="0" smtClean="0"/>
+              <a:t>50% </a:t>
+            </a:r>
+            <a:r>
+              <a:rPr lang="en-US" dirty="0"/>
+              <a:t>- 52%</a:t>
             </a:r>
           </a:p>
           <a:p>
@@ -5407,7 +5613,7 @@
           <p:nvPr/>
         </p:nvPicPr>
         <p:blipFill>
-          <a:blip r:embed="rId2"/>
+          <a:blip r:embed="rId3"/>
           <a:stretch>
             <a:fillRect/>
           </a:stretch>
@@ -6007,19 +6213,56 @@
           <a:p>
             <a:r>
               <a:rPr lang="en-US" dirty="0"/>
-              <a:t>Extract Subjective Information</a:t>
+              <a:t>Extract Subjective </a:t>
+            </a:r>
+            <a:r>
+              <a:rPr lang="en-US" dirty="0" smtClean="0"/>
+              <a:t>Information</a:t>
             </a:r>
           </a:p>
           <a:p>
             <a:pPr marL="0" indent="0">
               <a:buNone/>
             </a:pPr>
+            <a:endParaRPr lang="en-US" dirty="0" smtClean="0"/>
+          </a:p>
+          <a:p>
+            <a:r>
+              <a:rPr lang="en-US" dirty="0" smtClean="0"/>
+              <a:t>Is a </a:t>
+            </a:r>
+            <a:r>
+              <a:rPr lang="en-US" dirty="0" smtClean="0"/>
+              <a:t>tweet</a:t>
+            </a:r>
+            <a:r>
+              <a:rPr lang="en-US" dirty="0" smtClean="0"/>
+              <a:t> positive, negative, </a:t>
+            </a:r>
+            <a:r>
+              <a:rPr lang="en-US" dirty="0"/>
+              <a:t>or </a:t>
+            </a:r>
+            <a:r>
+              <a:rPr lang="en-US" dirty="0" smtClean="0"/>
+              <a:t>neutral</a:t>
+            </a:r>
+          </a:p>
+          <a:p>
             <a:endParaRPr lang="en-US" dirty="0"/>
           </a:p>
           <a:p>
             <a:r>
-              <a:rPr lang="en-US" dirty="0"/>
-              <a:t>Is the text good, bad, or neutral</a:t>
+              <a:rPr lang="en-US" dirty="0" smtClean="0"/>
+              <a:t>The </a:t>
+            </a:r>
+            <a:r>
+              <a:rPr lang="en-US" dirty="0"/>
+              <a:t>data was provided in a competition from </a:t>
+            </a:r>
+            <a:r>
+              <a:rPr lang="en-US" dirty="0" smtClean="0"/>
+              <a:t>semEval2017</a:t>
             </a:r>
           </a:p>
           <a:p>
@@ -6027,18 +6270,18 @@
           </a:p>
           <a:p>
             <a:r>
-              <a:rPr lang="en-US" dirty="0"/>
-              <a:t>The data was provided in a competition from semEval2017</a:t>
-            </a:r>
-          </a:p>
-          <a:p>
+              <a:rPr lang="en-US" dirty="0" smtClean="0"/>
+              <a:t>There </a:t>
+            </a:r>
+            <a:r>
+              <a:rPr lang="en-US" dirty="0"/>
+              <a:t>were 48 participants, and 38 in </a:t>
+            </a:r>
+            <a:r>
+              <a:rPr lang="en-US" dirty="0" smtClean="0"/>
+              <a:t>this subtask</a:t>
+            </a:r>
             <a:endParaRPr lang="en-US" dirty="0"/>
-          </a:p>
-          <a:p>
-            <a:r>
-              <a:rPr lang="en-US" dirty="0"/>
-              <a:t>There were 48 participants, and 38 in English subtask A</a:t>
-            </a:r>
           </a:p>
         </p:txBody>
       </p:sp>

</xml_diff>